<commit_message>
idd ->> ide, changes from meeting. TODO: -variable contributions to PC -improved class selection
</commit_message>
<xml_diff>
--- a/zDesignDrafts/MEDAL pitch and sketch.pptx
+++ b/zDesignDrafts/MEDAL pitch and sketch.pptx
@@ -3858,7 +3858,7 @@
         </p:blipFill>
         <p:spPr bwMode="auto">
           <a:xfrm>
-            <a:off x="7617166" y="4858744"/>
+            <a:off x="7598504" y="4858744"/>
             <a:ext cx="1517187" cy="1517187"/>
           </a:xfrm>
           <a:prstGeom prst="rect">
@@ -5935,7 +5935,7 @@
           <a:p>
             <a:r>
               <a:rPr lang="en-US" dirty="0"/>
-              <a:t>Tunnel vision on hypotheses &amp; models is dangerous; EDA is important and underused. [</a:t>
+              <a:t>Tunnel vision on hypotheses &amp; model is dangerous; EDA is important [</a:t>
             </a:r>
             <a:r>
               <a:rPr lang="en-US" dirty="0" err="1"/>
@@ -5965,7 +5965,7 @@
           <a:p>
             <a:r>
               <a:rPr lang="en-US" dirty="0"/>
-              <a:t>Researcher aren’t aware of model assumptions and don’t know how to check them. [</a:t>
+              <a:t>Researcher aren’t aware of model assumptions and don’t know how to check them [</a:t>
             </a:r>
             <a:r>
               <a:rPr lang="en-US" dirty="0" err="1"/>
@@ -5979,7 +5979,7 @@
           <a:p>
             <a:r>
               <a:rPr lang="en-US" dirty="0"/>
-              <a:t>Applying models without proper dimension reduction is needlessly expensive.</a:t>
+              <a:t>Applying models without proper dimension reduction is needlessly expensive</a:t>
             </a:r>
           </a:p>
           <a:p>
@@ -5995,7 +5995,7 @@
             </a:r>
             <a:r>
               <a:rPr lang="en-US" dirty="0"/>
-              <a:t>: R {shiny} application to help alleviate these gaps.</a:t>
+              <a:t>: R {shiny} application to help alleviate these gaps</a:t>
             </a:r>
           </a:p>
         </p:txBody>
@@ -6587,7 +6587,7 @@
         <p:spPr>
           <a:xfrm>
             <a:off x="6979373" y="239694"/>
-            <a:ext cx="4354586" cy="5262979"/>
+            <a:ext cx="4347989" cy="4616648"/>
           </a:xfrm>
           <a:prstGeom prst="rect">
             <a:avLst/>
@@ -6613,13 +6613,12 @@
                   </a:schemeClr>
                 </a:solidFill>
               </a:rPr>
-              <a:t>{shiny} app facilitating Machine Learning Exploratory Data Analysis </a:t>
-            </a:r>
-          </a:p>
-          <a:p>
-            <a:pPr marL="342900" indent="-342900">
-              <a:buAutoNum type="arabicParenR"/>
-            </a:pPr>
+              <a:t>{shiny} app, M</a:t>
+            </a:r>
+            <a:r>
+              <a:rPr lang="en-US" sz="1400" dirty="0"/>
+              <a:t>EDA</a:t>
+            </a:r>
             <a:r>
               <a:rPr lang="en-US" sz="1400" dirty="0">
                 <a:solidFill>
@@ -6628,13 +6627,12 @@
                   </a:schemeClr>
                 </a:solidFill>
               </a:rPr>
-              <a:t>Import </a:t>
-            </a:r>
-          </a:p>
-          <a:p>
-            <a:pPr marL="742950" lvl="1" indent="-285750">
-              <a:buFont typeface="Arial" panose="020B0604020202020204" pitchFamily="34" charset="0"/>
-              <a:buChar char="•"/>
+              <a:t>L --</a:t>
+            </a:r>
+          </a:p>
+          <a:p>
+            <a:pPr marL="342900" indent="-342900">
+              <a:buAutoNum type="arabicParenR"/>
             </a:pPr>
             <a:r>
               <a:rPr lang="en-US" sz="1400" dirty="0">
@@ -6644,7 +6642,7 @@
                   </a:schemeClr>
                 </a:solidFill>
               </a:rPr>
-              <a:t>Import tidy data</a:t>
+              <a:t>Import</a:t>
             </a:r>
           </a:p>
           <a:p>
@@ -6660,13 +6658,13 @@
                   </a:schemeClr>
                 </a:solidFill>
               </a:rPr>
-              <a:t>Preprocessing &amp; transform</a:t>
-            </a:r>
-          </a:p>
-          <a:p>
-            <a:pPr marL="342900" indent="-342900">
-              <a:buFont typeface="+mj-lt"/>
-              <a:buAutoNum type="arabicParenR"/>
+              <a:t>Load formatted data </a:t>
+            </a:r>
+          </a:p>
+          <a:p>
+            <a:pPr marL="742950" lvl="1" indent="-285750">
+              <a:buFont typeface="Arial" panose="020B0604020202020204" pitchFamily="34" charset="0"/>
+              <a:buChar char="•"/>
             </a:pPr>
             <a:r>
               <a:rPr lang="en-US" sz="1400" dirty="0">
@@ -6676,7 +6674,7 @@
                   </a:schemeClr>
                 </a:solidFill>
               </a:rPr>
-              <a:t>Check model assumptions (too much?)</a:t>
+              <a:t>Preprocess &amp; transform</a:t>
             </a:r>
           </a:p>
           <a:p>
@@ -6740,7 +6738,7 @@
                   </a:schemeClr>
                 </a:solidFill>
               </a:rPr>
-              <a:t>Look at Ensemble Graphics: outlierness, univariate density, animated linear projections (tours), Non-linear embedding (tSNE, MDS?)</a:t>
+              <a:t>Explore Ensemble Graphics: outlierness, univariate density, animated linear projections (tours), Non-linear embedding (tSNE)</a:t>
             </a:r>
           </a:p>
           <a:p>
@@ -6768,7 +6766,7 @@
                   </a:schemeClr>
                 </a:solidFill>
               </a:rPr>
-              <a:t>Processed data</a:t>
+              <a:t>Processed data, embedded space</a:t>
             </a:r>
           </a:p>
           <a:p>
@@ -6788,22 +6786,6 @@
             </a:r>
           </a:p>
           <a:p>
-            <a:pPr marL="742950" lvl="1" indent="-285750">
-              <a:buFont typeface="Arial" panose="020B0604020202020204" pitchFamily="34" charset="0"/>
-              <a:buChar char="•"/>
-            </a:pPr>
-            <a:r>
-              <a:rPr lang="en-US" sz="1400" dirty="0">
-                <a:solidFill>
-                  <a:schemeClr val="accent1">
-                    <a:lumMod val="75000"/>
-                  </a:schemeClr>
-                </a:solidFill>
-              </a:rPr>
-              <a:t>Emailed {knitr} document?</a:t>
-            </a:r>
-          </a:p>
-          <a:p>
             <a:r>
               <a:rPr lang="en-US" sz="1400" dirty="0">
                 <a:solidFill>
@@ -6860,7 +6842,7 @@
                   </a:schemeClr>
                 </a:solidFill>
               </a:rPr>
-              <a:t>Info icon everywhere giving explanation/source (&amp; default values)</a:t>
+              <a:t>Info icons giving explanation/source (&amp; default values)</a:t>
             </a:r>
             <a:br>
               <a:rPr lang="en-US" sz="1400" dirty="0">
@@ -7187,7 +7169,7 @@
                 <a:latin typeface="Arial" panose="020B0604020202020204" pitchFamily="34" charset="0"/>
                 <a:cs typeface="Arial" panose="020B0604020202020204" pitchFamily="34" charset="0"/>
               </a:rPr>
-              <a:t>(blue) proposed, N. Spyrison &amp; C. Doogan  </a:t>
+              <a:t>(blue) proposed, Spyrison, N. &amp; Doogan, C.  </a:t>
             </a:r>
           </a:p>
         </p:txBody>

</xml_diff>